<commit_message>
Divided presentation by elements of the group
</commit_message>
<xml_diff>
--- a/Checkpoints Outline/Checkpoint 1 - G16.pptx
+++ b/Checkpoints Outline/Checkpoint 1 - G16.pptx
@@ -704,6 +704,10 @@
           <a:bodyPr/>
           <a:lstStyle/>
           <a:p>
+            <a:r>
+              <a:rPr lang="pt-PT" dirty="0" smtClean="0"/>
+              <a:t>(Sousa)</a:t>
+            </a:r>
             <a:endParaRPr lang="pt-PT" dirty="0"/>
           </a:p>
         </p:txBody>
@@ -789,6 +793,354 @@
           <a:bodyPr/>
           <a:lstStyle/>
           <a:p>
+            <a:r>
+              <a:rPr lang="en-US" baseline="0" dirty="0" smtClean="0"/>
+              <a:t>(Sousa)</a:t>
+            </a:r>
+            <a:endParaRPr lang="en-US" baseline="0" dirty="0"/>
+          </a:p>
+        </p:txBody>
+      </p:sp>
+      <p:sp>
+        <p:nvSpPr>
+          <p:cNvPr id="4" name="Slide Number Placeholder 3"/>
+          <p:cNvSpPr>
+            <a:spLocks noGrp="1"/>
+          </p:cNvSpPr>
+          <p:nvPr>
+            <p:ph type="sldNum" sz="quarter" idx="10"/>
+          </p:nvPr>
+        </p:nvSpPr>
+        <p:spPr/>
+        <p:txBody>
+          <a:bodyPr/>
+          <a:lstStyle/>
+          <a:p>
+            <a:fld id="{F535F173-C1DD-4975-94BF-5B9ED67F7674}" type="slidenum">
+              <a:rPr lang="en-US" smtClean="0"/>
+              <a:pPr/>
+              <a:t>10</a:t>
+            </a:fld>
+            <a:endParaRPr lang="en-US"/>
+          </a:p>
+        </p:txBody>
+      </p:sp>
+    </p:spTree>
+    <p:extLst>
+      <p:ext uri="{BB962C8B-B14F-4D97-AF65-F5344CB8AC3E}">
+        <p14:creationId xmlns:p14="http://schemas.microsoft.com/office/powerpoint/2010/main" val="1162443830"/>
+      </p:ext>
+    </p:extLst>
+  </p:cSld>
+  <p:clrMapOvr>
+    <a:masterClrMapping/>
+  </p:clrMapOvr>
+</p:notes>
+</file>
+
+<file path=ppt/notesSlides/notesSlide11.xml><?xml version="1.0" encoding="utf-8"?>
+<p:notes xmlns:a="http://schemas.openxmlformats.org/drawingml/2006/main" xmlns:r="http://schemas.openxmlformats.org/officeDocument/2006/relationships" xmlns:p="http://schemas.openxmlformats.org/presentationml/2006/main">
+  <p:cSld>
+    <p:spTree>
+      <p:nvGrpSpPr>
+        <p:cNvPr id="1" name=""/>
+        <p:cNvGrpSpPr/>
+        <p:nvPr/>
+      </p:nvGrpSpPr>
+      <p:grpSpPr>
+        <a:xfrm>
+          <a:off x="0" y="0"/>
+          <a:ext cx="0" cy="0"/>
+          <a:chOff x="0" y="0"/>
+          <a:chExt cx="0" cy="0"/>
+        </a:xfrm>
+      </p:grpSpPr>
+      <p:sp>
+        <p:nvSpPr>
+          <p:cNvPr id="2" name="Marcador de Posição da Imagem do Diapositivo 1"/>
+          <p:cNvSpPr>
+            <a:spLocks noGrp="1" noRot="1" noChangeAspect="1"/>
+          </p:cNvSpPr>
+          <p:nvPr>
+            <p:ph type="sldImg"/>
+          </p:nvPr>
+        </p:nvSpPr>
+        <p:spPr/>
+      </p:sp>
+      <p:sp>
+        <p:nvSpPr>
+          <p:cNvPr id="3" name="Marcador de Posição de Notas 2"/>
+          <p:cNvSpPr>
+            <a:spLocks noGrp="1"/>
+          </p:cNvSpPr>
+          <p:nvPr>
+            <p:ph type="body" idx="1"/>
+          </p:nvPr>
+        </p:nvSpPr>
+        <p:spPr/>
+        <p:txBody>
+          <a:bodyPr/>
+          <a:lstStyle/>
+          <a:p>
+            <a:r>
+              <a:rPr lang="pt-PT" dirty="0" smtClean="0"/>
+              <a:t>(Sousa)</a:t>
+            </a:r>
+            <a:endParaRPr lang="pt-PT" dirty="0"/>
+          </a:p>
+        </p:txBody>
+      </p:sp>
+      <p:sp>
+        <p:nvSpPr>
+          <p:cNvPr id="4" name="Marcador de Posição do Número do Diapositivo 3"/>
+          <p:cNvSpPr>
+            <a:spLocks noGrp="1"/>
+          </p:cNvSpPr>
+          <p:nvPr>
+            <p:ph type="sldNum" sz="quarter" idx="10"/>
+          </p:nvPr>
+        </p:nvSpPr>
+        <p:spPr/>
+        <p:txBody>
+          <a:bodyPr/>
+          <a:lstStyle/>
+          <a:p>
+            <a:fld id="{F535F173-C1DD-4975-94BF-5B9ED67F7674}" type="slidenum">
+              <a:rPr lang="en-US" smtClean="0"/>
+              <a:pPr/>
+              <a:t>11</a:t>
+            </a:fld>
+            <a:endParaRPr lang="en-US"/>
+          </a:p>
+        </p:txBody>
+      </p:sp>
+    </p:spTree>
+    <p:extLst>
+      <p:ext uri="{BB962C8B-B14F-4D97-AF65-F5344CB8AC3E}">
+        <p14:creationId xmlns:p14="http://schemas.microsoft.com/office/powerpoint/2010/main" val="4191131113"/>
+      </p:ext>
+    </p:extLst>
+  </p:cSld>
+  <p:clrMapOvr>
+    <a:masterClrMapping/>
+  </p:clrMapOvr>
+</p:notes>
+</file>
+
+<file path=ppt/notesSlides/notesSlide12.xml><?xml version="1.0" encoding="utf-8"?>
+<p:notes xmlns:a="http://schemas.openxmlformats.org/drawingml/2006/main" xmlns:r="http://schemas.openxmlformats.org/officeDocument/2006/relationships" xmlns:p="http://schemas.openxmlformats.org/presentationml/2006/main">
+  <p:cSld>
+    <p:spTree>
+      <p:nvGrpSpPr>
+        <p:cNvPr id="1" name=""/>
+        <p:cNvGrpSpPr/>
+        <p:nvPr/>
+      </p:nvGrpSpPr>
+      <p:grpSpPr>
+        <a:xfrm>
+          <a:off x="0" y="0"/>
+          <a:ext cx="0" cy="0"/>
+          <a:chOff x="0" y="0"/>
+          <a:chExt cx="0" cy="0"/>
+        </a:xfrm>
+      </p:grpSpPr>
+      <p:sp>
+        <p:nvSpPr>
+          <p:cNvPr id="2" name="Slide Image Placeholder 1"/>
+          <p:cNvSpPr>
+            <a:spLocks noGrp="1" noRot="1" noChangeAspect="1"/>
+          </p:cNvSpPr>
+          <p:nvPr>
+            <p:ph type="sldImg"/>
+          </p:nvPr>
+        </p:nvSpPr>
+        <p:spPr/>
+      </p:sp>
+      <p:sp>
+        <p:nvSpPr>
+          <p:cNvPr id="3" name="Notes Placeholder 2"/>
+          <p:cNvSpPr>
+            <a:spLocks noGrp="1"/>
+          </p:cNvSpPr>
+          <p:nvPr>
+            <p:ph type="body" idx="1"/>
+          </p:nvPr>
+        </p:nvSpPr>
+        <p:spPr/>
+        <p:txBody>
+          <a:bodyPr/>
+          <a:lstStyle/>
+          <a:p>
+            <a:endParaRPr lang="en-US" baseline="0" dirty="0"/>
+          </a:p>
+        </p:txBody>
+      </p:sp>
+      <p:sp>
+        <p:nvSpPr>
+          <p:cNvPr id="4" name="Slide Number Placeholder 3"/>
+          <p:cNvSpPr>
+            <a:spLocks noGrp="1"/>
+          </p:cNvSpPr>
+          <p:nvPr>
+            <p:ph type="sldNum" sz="quarter" idx="10"/>
+          </p:nvPr>
+        </p:nvSpPr>
+        <p:spPr/>
+        <p:txBody>
+          <a:bodyPr/>
+          <a:lstStyle/>
+          <a:p>
+            <a:fld id="{F535F173-C1DD-4975-94BF-5B9ED67F7674}" type="slidenum">
+              <a:rPr lang="en-US" smtClean="0"/>
+              <a:pPr/>
+              <a:t>12</a:t>
+            </a:fld>
+            <a:endParaRPr lang="en-US"/>
+          </a:p>
+        </p:txBody>
+      </p:sp>
+    </p:spTree>
+    <p:extLst>
+      <p:ext uri="{BB962C8B-B14F-4D97-AF65-F5344CB8AC3E}">
+        <p14:creationId xmlns:p14="http://schemas.microsoft.com/office/powerpoint/2010/main" val="35205596"/>
+      </p:ext>
+    </p:extLst>
+  </p:cSld>
+  <p:clrMapOvr>
+    <a:masterClrMapping/>
+  </p:clrMapOvr>
+</p:notes>
+</file>
+
+<file path=ppt/notesSlides/notesSlide13.xml><?xml version="1.0" encoding="utf-8"?>
+<p:notes xmlns:a="http://schemas.openxmlformats.org/drawingml/2006/main" xmlns:r="http://schemas.openxmlformats.org/officeDocument/2006/relationships" xmlns:p="http://schemas.openxmlformats.org/presentationml/2006/main">
+  <p:cSld>
+    <p:spTree>
+      <p:nvGrpSpPr>
+        <p:cNvPr id="1" name=""/>
+        <p:cNvGrpSpPr/>
+        <p:nvPr/>
+      </p:nvGrpSpPr>
+      <p:grpSpPr>
+        <a:xfrm>
+          <a:off x="0" y="0"/>
+          <a:ext cx="0" cy="0"/>
+          <a:chOff x="0" y="0"/>
+          <a:chExt cx="0" cy="0"/>
+        </a:xfrm>
+      </p:grpSpPr>
+      <p:sp>
+        <p:nvSpPr>
+          <p:cNvPr id="2" name="Slide Image Placeholder 1"/>
+          <p:cNvSpPr>
+            <a:spLocks noGrp="1" noRot="1" noChangeAspect="1"/>
+          </p:cNvSpPr>
+          <p:nvPr>
+            <p:ph type="sldImg"/>
+          </p:nvPr>
+        </p:nvSpPr>
+        <p:spPr/>
+      </p:sp>
+      <p:sp>
+        <p:nvSpPr>
+          <p:cNvPr id="3" name="Notes Placeholder 2"/>
+          <p:cNvSpPr>
+            <a:spLocks noGrp="1"/>
+          </p:cNvSpPr>
+          <p:nvPr>
+            <p:ph type="body" idx="1"/>
+          </p:nvPr>
+        </p:nvSpPr>
+        <p:spPr/>
+        <p:txBody>
+          <a:bodyPr/>
+          <a:lstStyle/>
+          <a:p>
+            <a:endParaRPr lang="en-US" baseline="0" dirty="0"/>
+          </a:p>
+        </p:txBody>
+      </p:sp>
+      <p:sp>
+        <p:nvSpPr>
+          <p:cNvPr id="4" name="Slide Number Placeholder 3"/>
+          <p:cNvSpPr>
+            <a:spLocks noGrp="1"/>
+          </p:cNvSpPr>
+          <p:nvPr>
+            <p:ph type="sldNum" sz="quarter" idx="10"/>
+          </p:nvPr>
+        </p:nvSpPr>
+        <p:spPr/>
+        <p:txBody>
+          <a:bodyPr/>
+          <a:lstStyle/>
+          <a:p>
+            <a:fld id="{F535F173-C1DD-4975-94BF-5B9ED67F7674}" type="slidenum">
+              <a:rPr lang="en-US" smtClean="0"/>
+              <a:pPr/>
+              <a:t>13</a:t>
+            </a:fld>
+            <a:endParaRPr lang="en-US"/>
+          </a:p>
+        </p:txBody>
+      </p:sp>
+    </p:spTree>
+    <p:extLst>
+      <p:ext uri="{BB962C8B-B14F-4D97-AF65-F5344CB8AC3E}">
+        <p14:creationId xmlns:p14="http://schemas.microsoft.com/office/powerpoint/2010/main" val="494508095"/>
+      </p:ext>
+    </p:extLst>
+  </p:cSld>
+  <p:clrMapOvr>
+    <a:masterClrMapping/>
+  </p:clrMapOvr>
+</p:notes>
+</file>
+
+<file path=ppt/notesSlides/notesSlide14.xml><?xml version="1.0" encoding="utf-8"?>
+<p:notes xmlns:a="http://schemas.openxmlformats.org/drawingml/2006/main" xmlns:r="http://schemas.openxmlformats.org/officeDocument/2006/relationships" xmlns:p="http://schemas.openxmlformats.org/presentationml/2006/main">
+  <p:cSld>
+    <p:spTree>
+      <p:nvGrpSpPr>
+        <p:cNvPr id="1" name=""/>
+        <p:cNvGrpSpPr/>
+        <p:nvPr/>
+      </p:nvGrpSpPr>
+      <p:grpSpPr>
+        <a:xfrm>
+          <a:off x="0" y="0"/>
+          <a:ext cx="0" cy="0"/>
+          <a:chOff x="0" y="0"/>
+          <a:chExt cx="0" cy="0"/>
+        </a:xfrm>
+      </p:grpSpPr>
+      <p:sp>
+        <p:nvSpPr>
+          <p:cNvPr id="2" name="Slide Image Placeholder 1"/>
+          <p:cNvSpPr>
+            <a:spLocks noGrp="1" noRot="1" noChangeAspect="1"/>
+          </p:cNvSpPr>
+          <p:nvPr>
+            <p:ph type="sldImg"/>
+          </p:nvPr>
+        </p:nvSpPr>
+        <p:spPr/>
+      </p:sp>
+      <p:sp>
+        <p:nvSpPr>
+          <p:cNvPr id="3" name="Notes Placeholder 2"/>
+          <p:cNvSpPr>
+            <a:spLocks noGrp="1"/>
+          </p:cNvSpPr>
+          <p:nvPr>
+            <p:ph type="body" idx="1"/>
+          </p:nvPr>
+        </p:nvSpPr>
+        <p:spPr/>
+        <p:txBody>
+          <a:bodyPr/>
+          <a:lstStyle/>
+          <a:p>
             <a:endParaRPr lang="en-US" baseline="0" dirty="0"/>
           </a:p>
         </p:txBody>
@@ -849,7 +1201,7 @@
       </p:grpSpPr>
       <p:sp>
         <p:nvSpPr>
-          <p:cNvPr id="2" name="Slide Image Placeholder 1"/>
+          <p:cNvPr id="2" name="Marcador de Posição da Imagem do Diapositivo 1"/>
           <p:cNvSpPr>
             <a:spLocks noGrp="1" noRot="1" noChangeAspect="1"/>
           </p:cNvSpPr>
@@ -861,7 +1213,7 @@
       </p:sp>
       <p:sp>
         <p:nvSpPr>
-          <p:cNvPr id="3" name="Notes Placeholder 2"/>
+          <p:cNvPr id="3" name="Marcador de Posição de Notas 2"/>
           <p:cNvSpPr>
             <a:spLocks noGrp="1"/>
           </p:cNvSpPr>
@@ -874,74 +1226,16 @@
           <a:bodyPr/>
           <a:lstStyle/>
           <a:p>
-            <a:pPr marL="0" marR="0" lvl="0" indent="0" algn="l" defTabSz="914400" rtl="0" eaLnBrk="1" fontAlgn="auto" latinLnBrk="0" hangingPunct="1">
-              <a:lnSpc>
-                <a:spcPct val="100000"/>
-              </a:lnSpc>
-              <a:spcBef>
-                <a:spcPts val="0"/>
-              </a:spcBef>
-              <a:spcAft>
-                <a:spcPts val="0"/>
-              </a:spcAft>
-              <a:buClrTx/>
-              <a:buSzTx/>
-              <a:buFontTx/>
-              <a:buNone/>
-              <a:tabLst/>
-              <a:defRPr/>
-            </a:pPr>
-            <a:r>
-              <a:rPr lang="en-US" sz="1200" kern="1200" dirty="0" smtClean="0">
-                <a:solidFill>
-                  <a:schemeClr val="tx1"/>
-                </a:solidFill>
-                <a:effectLst/>
-                <a:latin typeface="+mn-lt"/>
-                <a:ea typeface="+mn-ea"/>
-                <a:cs typeface="+mn-cs"/>
-              </a:rPr>
-              <a:t>In this project we are looking into “</a:t>
-            </a:r>
-            <a:r>
-              <a:rPr lang="en-US" sz="1200" i="1" kern="1200" dirty="0" smtClean="0">
-                <a:solidFill>
-                  <a:schemeClr val="tx1"/>
-                </a:solidFill>
-                <a:effectLst/>
-                <a:latin typeface="+mn-lt"/>
-                <a:ea typeface="+mn-ea"/>
-                <a:cs typeface="+mn-cs"/>
-              </a:rPr>
-              <a:t>The Evolution of Mobile Phones: Brands and Specs</a:t>
-            </a:r>
-            <a:r>
-              <a:rPr lang="en-US" sz="1200" kern="1200" dirty="0" smtClean="0">
-                <a:solidFill>
-                  <a:schemeClr val="tx1"/>
-                </a:solidFill>
-                <a:effectLst/>
-                <a:latin typeface="+mn-lt"/>
-                <a:ea typeface="+mn-ea"/>
-                <a:cs typeface="+mn-cs"/>
-              </a:rPr>
-              <a:t>”. With this visualization, we hope to show how the brands and models developed over time both economically and in terms of the technology and its hardware. We think this is an interesting subject to explore because we are a technological generation and through this project we will be able to expose the evolution of a device so crucial to our lives.</a:t>
-            </a:r>
-            <a:endParaRPr lang="pt-PT" sz="1200" kern="1200" dirty="0" smtClean="0">
-              <a:solidFill>
-                <a:schemeClr val="tx1"/>
-              </a:solidFill>
-              <a:effectLst/>
-              <a:latin typeface="+mn-lt"/>
-              <a:ea typeface="+mn-ea"/>
-              <a:cs typeface="+mn-cs"/>
-            </a:endParaRPr>
-          </a:p>
-        </p:txBody>
-      </p:sp>
-      <p:sp>
-        <p:nvSpPr>
-          <p:cNvPr id="4" name="Slide Number Placeholder 3"/>
+            <a:r>
+              <a:rPr lang="pt-PT" dirty="0" smtClean="0"/>
+              <a:t>(Isabel)</a:t>
+            </a:r>
+          </a:p>
+        </p:txBody>
+      </p:sp>
+      <p:sp>
+        <p:nvSpPr>
+          <p:cNvPr id="4" name="Marcador de Posição do Número do Diapositivo 3"/>
           <p:cNvSpPr>
             <a:spLocks noGrp="1"/>
           </p:cNvSpPr>
@@ -957,7 +1251,7 @@
             <a:fld id="{F535F173-C1DD-4975-94BF-5B9ED67F7674}" type="slidenum">
               <a:rPr lang="en-US" smtClean="0"/>
               <a:pPr/>
-              <a:t>3</a:t>
+              <a:t>2</a:t>
             </a:fld>
             <a:endParaRPr lang="en-US"/>
           </a:p>
@@ -966,7 +1260,7 @@
     </p:spTree>
     <p:extLst>
       <p:ext uri="{BB962C8B-B14F-4D97-AF65-F5344CB8AC3E}">
-        <p14:creationId xmlns:p14="http://schemas.microsoft.com/office/powerpoint/2010/main" val="1355792998"/>
+        <p14:creationId xmlns:p14="http://schemas.microsoft.com/office/powerpoint/2010/main" val="303993931"/>
       </p:ext>
     </p:extLst>
   </p:cSld>
@@ -1020,8 +1314,25 @@
           <a:bodyPr/>
           <a:lstStyle/>
           <a:p>
-            <a:r>
-              <a:rPr lang="en-US" sz="1200" b="1" kern="1200" dirty="0" smtClean="0">
+            <a:pPr marL="0" marR="0" lvl="0" indent="0" algn="l" defTabSz="914400" rtl="0" eaLnBrk="1" fontAlgn="auto" latinLnBrk="0" hangingPunct="1">
+              <a:lnSpc>
+                <a:spcPct val="100000"/>
+              </a:lnSpc>
+              <a:spcBef>
+                <a:spcPts val="0"/>
+              </a:spcBef>
+              <a:spcAft>
+                <a:spcPts val="0"/>
+              </a:spcAft>
+              <a:buClrTx/>
+              <a:buSzTx/>
+              <a:buFontTx/>
+              <a:buNone/>
+              <a:tabLst/>
+              <a:defRPr/>
+            </a:pPr>
+            <a:r>
+              <a:rPr lang="en-US" sz="1200" kern="1200" dirty="0" smtClean="0">
                 <a:solidFill>
                   <a:schemeClr val="tx1"/>
                 </a:solidFill>
@@ -1030,130 +1341,27 @@
                 <a:ea typeface="+mn-ea"/>
                 <a:cs typeface="+mn-cs"/>
               </a:rPr>
-              <a:t>We came across two different datasets that will complement each other to enhance the visualization:</a:t>
-            </a:r>
-            <a:endParaRPr lang="pt-PT" sz="1200" b="1" kern="1200" dirty="0" smtClean="0">
-              <a:solidFill>
-                <a:schemeClr val="tx1"/>
-              </a:solidFill>
-              <a:effectLst/>
-              <a:latin typeface="+mn-lt"/>
-              <a:ea typeface="+mn-ea"/>
-              <a:cs typeface="+mn-cs"/>
-            </a:endParaRPr>
-          </a:p>
-          <a:p>
-            <a:pPr lvl="0"/>
-            <a:r>
-              <a:rPr lang="en-US" sz="1200" b="1" kern="1200" dirty="0" smtClean="0">
-                <a:solidFill>
-                  <a:schemeClr val="tx1"/>
-                </a:solidFill>
-                <a:effectLst/>
-                <a:latin typeface="+mn-lt"/>
-                <a:ea typeface="+mn-ea"/>
-                <a:cs typeface="+mn-cs"/>
-              </a:rPr>
-              <a:t>The datasets we’ll be using are “</a:t>
-            </a:r>
-            <a:r>
-              <a:rPr lang="en-US" sz="1200" b="1" i="1" kern="1200" dirty="0" smtClean="0">
-                <a:solidFill>
-                  <a:schemeClr val="tx1"/>
-                </a:solidFill>
-                <a:effectLst/>
-                <a:latin typeface="+mn-lt"/>
-                <a:ea typeface="+mn-ea"/>
-                <a:cs typeface="+mn-cs"/>
-              </a:rPr>
-              <a:t>Cell Phones Brands and Models</a:t>
-            </a:r>
-            <a:r>
-              <a:rPr lang="en-US" sz="1200" b="1" kern="1200" dirty="0" smtClean="0">
-                <a:solidFill>
-                  <a:schemeClr val="tx1"/>
-                </a:solidFill>
-                <a:effectLst/>
-                <a:latin typeface="+mn-lt"/>
-                <a:ea typeface="+mn-ea"/>
-                <a:cs typeface="+mn-cs"/>
-              </a:rPr>
-              <a:t>” and “</a:t>
-            </a:r>
-            <a:r>
-              <a:rPr lang="en-US" sz="1200" b="1" i="1" kern="1200" dirty="0" smtClean="0">
-                <a:solidFill>
-                  <a:schemeClr val="tx1"/>
-                </a:solidFill>
-                <a:effectLst/>
-                <a:latin typeface="+mn-lt"/>
-                <a:ea typeface="+mn-ea"/>
-                <a:cs typeface="+mn-cs"/>
-              </a:rPr>
-              <a:t>List of best-selling mobile phones - Annual sales by manufacturer</a:t>
-            </a:r>
-            <a:r>
-              <a:rPr lang="en-US" sz="1200" b="1" kern="1200" dirty="0" smtClean="0">
-                <a:solidFill>
-                  <a:schemeClr val="tx1"/>
-                </a:solidFill>
-                <a:effectLst/>
-                <a:latin typeface="+mn-lt"/>
-                <a:ea typeface="+mn-ea"/>
-                <a:cs typeface="+mn-cs"/>
-              </a:rPr>
-              <a:t>”.</a:t>
-            </a:r>
-            <a:endParaRPr lang="pt-PT" sz="1200" b="1" kern="1200" dirty="0" smtClean="0">
-              <a:solidFill>
-                <a:schemeClr val="tx1"/>
-              </a:solidFill>
-              <a:effectLst/>
-              <a:latin typeface="+mn-lt"/>
-              <a:ea typeface="+mn-ea"/>
-              <a:cs typeface="+mn-cs"/>
-            </a:endParaRPr>
-          </a:p>
-          <a:p>
-            <a:r>
-              <a:rPr lang="en-US" sz="1200" kern="1200" dirty="0" smtClean="0">
-                <a:solidFill>
-                  <a:schemeClr val="tx1"/>
-                </a:solidFill>
-                <a:effectLst/>
-                <a:latin typeface="+mn-lt"/>
-                <a:ea typeface="+mn-ea"/>
-                <a:cs typeface="+mn-cs"/>
-              </a:rPr>
-              <a:t>The first dataset is available in </a:t>
-            </a:r>
-            <a:r>
-              <a:rPr lang="en-US" sz="1200" u="sng" kern="1200" dirty="0" smtClean="0">
-                <a:solidFill>
-                  <a:schemeClr val="tx1"/>
-                </a:solidFill>
-                <a:effectLst/>
-                <a:latin typeface="+mn-lt"/>
-                <a:ea typeface="+mn-ea"/>
-                <a:cs typeface="+mn-cs"/>
-                <a:hlinkClick r:id="rId3"/>
-              </a:rPr>
-              <a:t>Back4App</a:t>
-            </a:r>
-            <a:r>
-              <a:rPr lang="en-US" sz="1200" kern="1200" dirty="0" smtClean="0">
-                <a:solidFill>
-                  <a:schemeClr val="tx1"/>
-                </a:solidFill>
-                <a:effectLst/>
-                <a:latin typeface="+mn-lt"/>
-                <a:ea typeface="+mn-ea"/>
-                <a:cs typeface="+mn-cs"/>
-              </a:rPr>
-              <a:t> and can be freely downloaded for further use and can be accessed either by the raw file or by their API. </a:t>
-            </a:r>
-          </a:p>
-          <a:p>
+              <a:t>(Isabel)</a:t>
+            </a:r>
+          </a:p>
+          <a:p>
+            <a:pPr marL="0" marR="0" lvl="0" indent="0" algn="l" defTabSz="914400" rtl="0" eaLnBrk="1" fontAlgn="auto" latinLnBrk="0" hangingPunct="1">
+              <a:lnSpc>
+                <a:spcPct val="100000"/>
+              </a:lnSpc>
+              <a:spcBef>
+                <a:spcPts val="0"/>
+              </a:spcBef>
+              <a:spcAft>
+                <a:spcPts val="0"/>
+              </a:spcAft>
+              <a:buClrTx/>
+              <a:buSzTx/>
+              <a:buFontTx/>
+              <a:buNone/>
+              <a:tabLst/>
+              <a:defRPr/>
+            </a:pPr>
             <a:endParaRPr lang="en-US" sz="1200" kern="1200" dirty="0" smtClean="0">
               <a:solidFill>
                 <a:schemeClr val="tx1"/>
@@ -1165,10 +1373,80 @@
             </a:endParaRPr>
           </a:p>
           <a:p>
-            <a:r>
-              <a:rPr lang="en-US" baseline="0" dirty="0" smtClean="0"/>
-              <a:t>https://www.back4app.com/database/paul-datasets/cell-phone-dataset</a:t>
-            </a:r>
+            <a:pPr marL="0" marR="0" lvl="0" indent="0" algn="l" defTabSz="914400" rtl="0" eaLnBrk="1" fontAlgn="auto" latinLnBrk="0" hangingPunct="1">
+              <a:lnSpc>
+                <a:spcPct val="100000"/>
+              </a:lnSpc>
+              <a:spcBef>
+                <a:spcPts val="0"/>
+              </a:spcBef>
+              <a:spcAft>
+                <a:spcPts val="0"/>
+              </a:spcAft>
+              <a:buClrTx/>
+              <a:buSzTx/>
+              <a:buFontTx/>
+              <a:buNone/>
+              <a:tabLst/>
+              <a:defRPr/>
+            </a:pPr>
+            <a:r>
+              <a:rPr lang="en-US" sz="1200" kern="1200" dirty="0" smtClean="0">
+                <a:solidFill>
+                  <a:schemeClr val="tx1"/>
+                </a:solidFill>
+                <a:effectLst/>
+                <a:latin typeface="+mn-lt"/>
+                <a:ea typeface="+mn-ea"/>
+                <a:cs typeface="+mn-cs"/>
+              </a:rPr>
+              <a:t>In </a:t>
+            </a:r>
+            <a:r>
+              <a:rPr lang="en-US" sz="1200" kern="1200" dirty="0" smtClean="0">
+                <a:solidFill>
+                  <a:schemeClr val="tx1"/>
+                </a:solidFill>
+                <a:effectLst/>
+                <a:latin typeface="+mn-lt"/>
+                <a:ea typeface="+mn-ea"/>
+                <a:cs typeface="+mn-cs"/>
+              </a:rPr>
+              <a:t>this project we are looking into “</a:t>
+            </a:r>
+            <a:r>
+              <a:rPr lang="en-US" sz="1200" i="1" kern="1200" dirty="0" smtClean="0">
+                <a:solidFill>
+                  <a:schemeClr val="tx1"/>
+                </a:solidFill>
+                <a:effectLst/>
+                <a:latin typeface="+mn-lt"/>
+                <a:ea typeface="+mn-ea"/>
+                <a:cs typeface="+mn-cs"/>
+              </a:rPr>
+              <a:t>The Evolution of Mobile Phones: Brands and Specs</a:t>
+            </a:r>
+            <a:r>
+              <a:rPr lang="en-US" sz="1200" kern="1200" dirty="0" smtClean="0">
+                <a:solidFill>
+                  <a:schemeClr val="tx1"/>
+                </a:solidFill>
+                <a:effectLst/>
+                <a:latin typeface="+mn-lt"/>
+                <a:ea typeface="+mn-ea"/>
+                <a:cs typeface="+mn-cs"/>
+              </a:rPr>
+              <a:t>”. With this visualization, we hope to show how the brands and models developed over time both economically and in terms of the technology and its hardware. We think this is an interesting subject to explore because we are a technological generation and through this project we will be able to expose the evolution of a device so crucial to our lives.</a:t>
+            </a:r>
+            <a:endParaRPr lang="pt-PT" sz="1200" kern="1200" dirty="0" smtClean="0">
+              <a:solidFill>
+                <a:schemeClr val="tx1"/>
+              </a:solidFill>
+              <a:effectLst/>
+              <a:latin typeface="+mn-lt"/>
+              <a:ea typeface="+mn-ea"/>
+              <a:cs typeface="+mn-cs"/>
+            </a:endParaRPr>
           </a:p>
         </p:txBody>
       </p:sp>
@@ -1190,7 +1468,7 @@
             <a:fld id="{F535F173-C1DD-4975-94BF-5B9ED67F7674}" type="slidenum">
               <a:rPr lang="en-US" smtClean="0"/>
               <a:pPr/>
-              <a:t>5</a:t>
+              <a:t>3</a:t>
             </a:fld>
             <a:endParaRPr lang="en-US"/>
           </a:p>
@@ -1228,7 +1506,7 @@
       </p:grpSpPr>
       <p:sp>
         <p:nvSpPr>
-          <p:cNvPr id="2" name="Slide Image Placeholder 1"/>
+          <p:cNvPr id="2" name="Marcador de Posição da Imagem do Diapositivo 1"/>
           <p:cNvSpPr>
             <a:spLocks noGrp="1" noRot="1" noChangeAspect="1"/>
           </p:cNvSpPr>
@@ -1240,7 +1518,7 @@
       </p:sp>
       <p:sp>
         <p:nvSpPr>
-          <p:cNvPr id="3" name="Notes Placeholder 2"/>
+          <p:cNvPr id="3" name="Marcador de Posição de Notas 2"/>
           <p:cNvSpPr>
             <a:spLocks noGrp="1"/>
           </p:cNvSpPr>
@@ -1253,137 +1531,17 @@
           <a:bodyPr/>
           <a:lstStyle/>
           <a:p>
-            <a:pPr marL="0" marR="0" lvl="0" indent="0" algn="l" defTabSz="914400" rtl="0" eaLnBrk="1" fontAlgn="auto" latinLnBrk="0" hangingPunct="1">
-              <a:lnSpc>
-                <a:spcPct val="100000"/>
-              </a:lnSpc>
-              <a:spcBef>
-                <a:spcPts val="0"/>
-              </a:spcBef>
-              <a:spcAft>
-                <a:spcPts val="0"/>
-              </a:spcAft>
-              <a:buClrTx/>
-              <a:buSzTx/>
-              <a:buFontTx/>
-              <a:buNone/>
-              <a:tabLst/>
-              <a:defRPr/>
-            </a:pPr>
-            <a:r>
-              <a:rPr lang="en-US" sz="1200" b="1" kern="1200" dirty="0" smtClean="0">
-                <a:solidFill>
-                  <a:schemeClr val="tx1"/>
-                </a:solidFill>
-                <a:effectLst/>
-                <a:latin typeface="+mn-lt"/>
-                <a:ea typeface="+mn-ea"/>
-                <a:cs typeface="+mn-cs"/>
-              </a:rPr>
-              <a:t>The second dataset will need to be treated because the information is stored on a table of a </a:t>
-            </a:r>
-            <a:r>
-              <a:rPr lang="en-US" sz="1200" b="1" u="sng" kern="1200" dirty="0" smtClean="0">
-                <a:solidFill>
-                  <a:schemeClr val="tx1"/>
-                </a:solidFill>
-                <a:effectLst/>
-                <a:latin typeface="+mn-lt"/>
-                <a:ea typeface="+mn-ea"/>
-                <a:cs typeface="+mn-cs"/>
-                <a:hlinkClick r:id="rId3"/>
-              </a:rPr>
-              <a:t>Wikipedia Web Page</a:t>
-            </a:r>
-            <a:r>
-              <a:rPr lang="en-US" sz="1200" b="1" kern="1200" dirty="0" smtClean="0">
-                <a:solidFill>
-                  <a:schemeClr val="tx1"/>
-                </a:solidFill>
-                <a:effectLst/>
-                <a:latin typeface="+mn-lt"/>
-                <a:ea typeface="+mn-ea"/>
-                <a:cs typeface="+mn-cs"/>
-              </a:rPr>
-              <a:t>. Furthermore, the last dataset will complement the first dataset, which doesn't contain the brands sales.</a:t>
-            </a:r>
-          </a:p>
-          <a:p>
-            <a:pPr marL="0" marR="0" lvl="0" indent="0" algn="l" defTabSz="914400" rtl="0" eaLnBrk="1" fontAlgn="auto" latinLnBrk="0" hangingPunct="1">
-              <a:lnSpc>
-                <a:spcPct val="100000"/>
-              </a:lnSpc>
-              <a:spcBef>
-                <a:spcPts val="0"/>
-              </a:spcBef>
-              <a:spcAft>
-                <a:spcPts val="0"/>
-              </a:spcAft>
-              <a:buClrTx/>
-              <a:buSzTx/>
-              <a:buFontTx/>
-              <a:buNone/>
-              <a:tabLst/>
-              <a:defRPr/>
-            </a:pPr>
-            <a:endParaRPr lang="en-US" sz="1200" b="1" kern="1200" dirty="0" smtClean="0">
-              <a:solidFill>
-                <a:schemeClr val="tx1"/>
-              </a:solidFill>
-              <a:effectLst/>
-              <a:latin typeface="+mn-lt"/>
-              <a:ea typeface="+mn-ea"/>
-              <a:cs typeface="+mn-cs"/>
-            </a:endParaRPr>
-          </a:p>
-          <a:p>
-            <a:pPr marL="0" marR="0" lvl="0" indent="0" algn="l" defTabSz="914400" rtl="0" eaLnBrk="1" fontAlgn="auto" latinLnBrk="0" hangingPunct="1">
-              <a:lnSpc>
-                <a:spcPct val="100000"/>
-              </a:lnSpc>
-              <a:spcBef>
-                <a:spcPts val="0"/>
-              </a:spcBef>
-              <a:spcAft>
-                <a:spcPts val="0"/>
-              </a:spcAft>
-              <a:buClrTx/>
-              <a:buSzTx/>
-              <a:buFontTx/>
-              <a:buNone/>
-              <a:tabLst/>
-              <a:defRPr/>
-            </a:pPr>
-            <a:r>
-              <a:rPr lang="pt-PT" sz="1200" b="1" kern="1200" smtClean="0">
-                <a:solidFill>
-                  <a:schemeClr val="tx1"/>
-                </a:solidFill>
-                <a:effectLst/>
-                <a:latin typeface="+mn-lt"/>
-                <a:ea typeface="+mn-ea"/>
-                <a:cs typeface="+mn-cs"/>
-              </a:rPr>
-              <a:t>https://en.wikipedia.org/wiki/List_of_best-selling_mobile_phones#Annual_sales_by_manufacturer</a:t>
-            </a:r>
-            <a:endParaRPr lang="pt-PT" sz="1200" b="1" kern="1200" dirty="0" smtClean="0">
-              <a:solidFill>
-                <a:schemeClr val="tx1"/>
-              </a:solidFill>
-              <a:effectLst/>
-              <a:latin typeface="+mn-lt"/>
-              <a:ea typeface="+mn-ea"/>
-              <a:cs typeface="+mn-cs"/>
-            </a:endParaRPr>
-          </a:p>
-          <a:p>
-            <a:endParaRPr lang="en-US" baseline="0" dirty="0"/>
-          </a:p>
-        </p:txBody>
-      </p:sp>
-      <p:sp>
-        <p:nvSpPr>
-          <p:cNvPr id="4" name="Slide Number Placeholder 3"/>
+            <a:r>
+              <a:rPr lang="pt-PT" dirty="0" smtClean="0"/>
+              <a:t>(Daniel)</a:t>
+            </a:r>
+            <a:endParaRPr lang="pt-PT" dirty="0"/>
+          </a:p>
+        </p:txBody>
+      </p:sp>
+      <p:sp>
+        <p:nvSpPr>
+          <p:cNvPr id="4" name="Marcador de Posição do Número do Diapositivo 3"/>
           <p:cNvSpPr>
             <a:spLocks noGrp="1"/>
           </p:cNvSpPr>
@@ -1399,7 +1557,7 @@
             <a:fld id="{F535F173-C1DD-4975-94BF-5B9ED67F7674}" type="slidenum">
               <a:rPr lang="en-US" smtClean="0"/>
               <a:pPr/>
-              <a:t>6</a:t>
+              <a:t>4</a:t>
             </a:fld>
             <a:endParaRPr lang="en-US"/>
           </a:p>
@@ -1408,7 +1566,7 @@
     </p:spTree>
     <p:extLst>
       <p:ext uri="{BB962C8B-B14F-4D97-AF65-F5344CB8AC3E}">
-        <p14:creationId xmlns:p14="http://schemas.microsoft.com/office/powerpoint/2010/main" val="2874797275"/>
+        <p14:creationId xmlns:p14="http://schemas.microsoft.com/office/powerpoint/2010/main" val="1462511686"/>
       </p:ext>
     </p:extLst>
   </p:cSld>
@@ -1462,7 +1620,192 @@
           <a:bodyPr/>
           <a:lstStyle/>
           <a:p>
-            <a:endParaRPr lang="en-US" baseline="0" dirty="0"/>
+            <a:r>
+              <a:rPr lang="en-US" sz="1200" b="1" kern="1200" dirty="0" smtClean="0">
+                <a:solidFill>
+                  <a:schemeClr val="tx1"/>
+                </a:solidFill>
+                <a:effectLst/>
+                <a:latin typeface="+mn-lt"/>
+                <a:ea typeface="+mn-ea"/>
+                <a:cs typeface="+mn-cs"/>
+              </a:rPr>
+              <a:t>(Daniel)</a:t>
+            </a:r>
+          </a:p>
+          <a:p>
+            <a:endParaRPr lang="en-US" sz="1200" b="1" kern="1200" dirty="0" smtClean="0">
+              <a:solidFill>
+                <a:schemeClr val="tx1"/>
+              </a:solidFill>
+              <a:effectLst/>
+              <a:latin typeface="+mn-lt"/>
+              <a:ea typeface="+mn-ea"/>
+              <a:cs typeface="+mn-cs"/>
+            </a:endParaRPr>
+          </a:p>
+          <a:p>
+            <a:r>
+              <a:rPr lang="en-US" sz="1200" b="1" kern="1200" dirty="0" smtClean="0">
+                <a:solidFill>
+                  <a:schemeClr val="tx1"/>
+                </a:solidFill>
+                <a:effectLst/>
+                <a:latin typeface="+mn-lt"/>
+                <a:ea typeface="+mn-ea"/>
+                <a:cs typeface="+mn-cs"/>
+              </a:rPr>
+              <a:t>We </a:t>
+            </a:r>
+            <a:r>
+              <a:rPr lang="en-US" sz="1200" b="1" kern="1200" dirty="0" smtClean="0">
+                <a:solidFill>
+                  <a:schemeClr val="tx1"/>
+                </a:solidFill>
+                <a:effectLst/>
+                <a:latin typeface="+mn-lt"/>
+                <a:ea typeface="+mn-ea"/>
+                <a:cs typeface="+mn-cs"/>
+              </a:rPr>
+              <a:t>came across two different datasets that will complement each other to enhance the visualization:</a:t>
+            </a:r>
+            <a:endParaRPr lang="pt-PT" sz="1200" b="1" kern="1200" dirty="0" smtClean="0">
+              <a:solidFill>
+                <a:schemeClr val="tx1"/>
+              </a:solidFill>
+              <a:effectLst/>
+              <a:latin typeface="+mn-lt"/>
+              <a:ea typeface="+mn-ea"/>
+              <a:cs typeface="+mn-cs"/>
+            </a:endParaRPr>
+          </a:p>
+          <a:p>
+            <a:pPr lvl="0"/>
+            <a:r>
+              <a:rPr lang="en-US" sz="1200" b="1" kern="1200" dirty="0" smtClean="0">
+                <a:solidFill>
+                  <a:schemeClr val="tx1"/>
+                </a:solidFill>
+                <a:effectLst/>
+                <a:latin typeface="+mn-lt"/>
+                <a:ea typeface="+mn-ea"/>
+                <a:cs typeface="+mn-cs"/>
+              </a:rPr>
+              <a:t>The datasets we’ll be using are “</a:t>
+            </a:r>
+            <a:r>
+              <a:rPr lang="en-US" sz="1200" b="1" i="1" kern="1200" dirty="0" smtClean="0">
+                <a:solidFill>
+                  <a:schemeClr val="tx1"/>
+                </a:solidFill>
+                <a:effectLst/>
+                <a:latin typeface="+mn-lt"/>
+                <a:ea typeface="+mn-ea"/>
+                <a:cs typeface="+mn-cs"/>
+              </a:rPr>
+              <a:t>Cell Phones Brands and Models</a:t>
+            </a:r>
+            <a:r>
+              <a:rPr lang="en-US" sz="1200" b="1" kern="1200" dirty="0" smtClean="0">
+                <a:solidFill>
+                  <a:schemeClr val="tx1"/>
+                </a:solidFill>
+                <a:effectLst/>
+                <a:latin typeface="+mn-lt"/>
+                <a:ea typeface="+mn-ea"/>
+                <a:cs typeface="+mn-cs"/>
+              </a:rPr>
+              <a:t>” and “</a:t>
+            </a:r>
+            <a:r>
+              <a:rPr lang="en-US" sz="1200" b="1" i="1" kern="1200" dirty="0" smtClean="0">
+                <a:solidFill>
+                  <a:schemeClr val="tx1"/>
+                </a:solidFill>
+                <a:effectLst/>
+                <a:latin typeface="+mn-lt"/>
+                <a:ea typeface="+mn-ea"/>
+                <a:cs typeface="+mn-cs"/>
+              </a:rPr>
+              <a:t>List of best-selling mobile phones - Annual sales by manufacturer</a:t>
+            </a:r>
+            <a:r>
+              <a:rPr lang="en-US" sz="1200" b="1" kern="1200" dirty="0" smtClean="0">
+                <a:solidFill>
+                  <a:schemeClr val="tx1"/>
+                </a:solidFill>
+                <a:effectLst/>
+                <a:latin typeface="+mn-lt"/>
+                <a:ea typeface="+mn-ea"/>
+                <a:cs typeface="+mn-cs"/>
+              </a:rPr>
+              <a:t>”.</a:t>
+            </a:r>
+            <a:endParaRPr lang="pt-PT" sz="1200" b="1" kern="1200" dirty="0" smtClean="0">
+              <a:solidFill>
+                <a:schemeClr val="tx1"/>
+              </a:solidFill>
+              <a:effectLst/>
+              <a:latin typeface="+mn-lt"/>
+              <a:ea typeface="+mn-ea"/>
+              <a:cs typeface="+mn-cs"/>
+            </a:endParaRPr>
+          </a:p>
+          <a:p>
+            <a:r>
+              <a:rPr lang="en-US" sz="1200" kern="1200" dirty="0" smtClean="0">
+                <a:solidFill>
+                  <a:schemeClr val="tx1"/>
+                </a:solidFill>
+                <a:effectLst/>
+                <a:latin typeface="+mn-lt"/>
+                <a:ea typeface="+mn-ea"/>
+                <a:cs typeface="+mn-cs"/>
+              </a:rPr>
+              <a:t>The first dataset is available in </a:t>
+            </a:r>
+            <a:r>
+              <a:rPr lang="en-US" sz="1200" u="sng" kern="1200" dirty="0" smtClean="0">
+                <a:solidFill>
+                  <a:schemeClr val="tx1"/>
+                </a:solidFill>
+                <a:effectLst/>
+                <a:latin typeface="+mn-lt"/>
+                <a:ea typeface="+mn-ea"/>
+                <a:cs typeface="+mn-cs"/>
+                <a:hlinkClick r:id="rId3"/>
+              </a:rPr>
+              <a:t>Back4App</a:t>
+            </a:r>
+            <a:r>
+              <a:rPr lang="en-US" sz="1200" kern="1200" dirty="0" smtClean="0">
+                <a:solidFill>
+                  <a:schemeClr val="tx1"/>
+                </a:solidFill>
+                <a:effectLst/>
+                <a:latin typeface="+mn-lt"/>
+                <a:ea typeface="+mn-ea"/>
+                <a:cs typeface="+mn-cs"/>
+              </a:rPr>
+              <a:t> and can be freely downloaded for further use and can be accessed either by the raw file or by their API. </a:t>
+            </a:r>
+          </a:p>
+          <a:p>
+            <a:endParaRPr lang="en-US" sz="1200" kern="1200" dirty="0" smtClean="0">
+              <a:solidFill>
+                <a:schemeClr val="tx1"/>
+              </a:solidFill>
+              <a:effectLst/>
+              <a:latin typeface="+mn-lt"/>
+              <a:ea typeface="+mn-ea"/>
+              <a:cs typeface="+mn-cs"/>
+            </a:endParaRPr>
+          </a:p>
+          <a:p>
+            <a:r>
+              <a:rPr lang="en-US" baseline="0" dirty="0" smtClean="0"/>
+              <a:t>https://www.back4app.com/database/paul-datasets/cell-phone-dataset</a:t>
+            </a:r>
           </a:p>
         </p:txBody>
       </p:sp>
@@ -1484,7 +1827,7 @@
             <a:fld id="{F535F173-C1DD-4975-94BF-5B9ED67F7674}" type="slidenum">
               <a:rPr lang="en-US" smtClean="0"/>
               <a:pPr/>
-              <a:t>8</a:t>
+              <a:t>5</a:t>
             </a:fld>
             <a:endParaRPr lang="en-US"/>
           </a:p>
@@ -1547,6 +1890,192 @@
           <a:bodyPr/>
           <a:lstStyle/>
           <a:p>
+            <a:pPr marL="0" marR="0" lvl="0" indent="0" algn="l" defTabSz="914400" rtl="0" eaLnBrk="1" fontAlgn="auto" latinLnBrk="0" hangingPunct="1">
+              <a:lnSpc>
+                <a:spcPct val="100000"/>
+              </a:lnSpc>
+              <a:spcBef>
+                <a:spcPts val="0"/>
+              </a:spcBef>
+              <a:spcAft>
+                <a:spcPts val="0"/>
+              </a:spcAft>
+              <a:buClrTx/>
+              <a:buSzTx/>
+              <a:buFontTx/>
+              <a:buNone/>
+              <a:tabLst/>
+              <a:defRPr/>
+            </a:pPr>
+            <a:r>
+              <a:rPr lang="en-US" sz="1200" b="1" kern="1200" dirty="0" smtClean="0">
+                <a:solidFill>
+                  <a:schemeClr val="tx1"/>
+                </a:solidFill>
+                <a:effectLst/>
+                <a:latin typeface="+mn-lt"/>
+                <a:ea typeface="+mn-ea"/>
+                <a:cs typeface="+mn-cs"/>
+              </a:rPr>
+              <a:t>(Sousa)</a:t>
+            </a:r>
+          </a:p>
+          <a:p>
+            <a:pPr marL="0" marR="0" lvl="0" indent="0" algn="l" defTabSz="914400" rtl="0" eaLnBrk="1" fontAlgn="auto" latinLnBrk="0" hangingPunct="1">
+              <a:lnSpc>
+                <a:spcPct val="100000"/>
+              </a:lnSpc>
+              <a:spcBef>
+                <a:spcPts val="0"/>
+              </a:spcBef>
+              <a:spcAft>
+                <a:spcPts val="0"/>
+              </a:spcAft>
+              <a:buClrTx/>
+              <a:buSzTx/>
+              <a:buFontTx/>
+              <a:buNone/>
+              <a:tabLst/>
+              <a:defRPr/>
+            </a:pPr>
+            <a:endParaRPr lang="en-US" sz="1200" b="1" kern="1200" dirty="0" smtClean="0">
+              <a:solidFill>
+                <a:schemeClr val="tx1"/>
+              </a:solidFill>
+              <a:effectLst/>
+              <a:latin typeface="+mn-lt"/>
+              <a:ea typeface="+mn-ea"/>
+              <a:cs typeface="+mn-cs"/>
+            </a:endParaRPr>
+          </a:p>
+          <a:p>
+            <a:pPr marL="0" marR="0" lvl="0" indent="0" algn="l" defTabSz="914400" rtl="0" eaLnBrk="1" fontAlgn="auto" latinLnBrk="0" hangingPunct="1">
+              <a:lnSpc>
+                <a:spcPct val="100000"/>
+              </a:lnSpc>
+              <a:spcBef>
+                <a:spcPts val="0"/>
+              </a:spcBef>
+              <a:spcAft>
+                <a:spcPts val="0"/>
+              </a:spcAft>
+              <a:buClrTx/>
+              <a:buSzTx/>
+              <a:buFontTx/>
+              <a:buNone/>
+              <a:tabLst/>
+              <a:defRPr/>
+            </a:pPr>
+            <a:r>
+              <a:rPr lang="en-US" sz="1200" b="1" kern="1200" dirty="0" smtClean="0">
+                <a:solidFill>
+                  <a:schemeClr val="tx1"/>
+                </a:solidFill>
+                <a:effectLst/>
+                <a:latin typeface="+mn-lt"/>
+                <a:ea typeface="+mn-ea"/>
+                <a:cs typeface="+mn-cs"/>
+              </a:rPr>
+              <a:t>The </a:t>
+            </a:r>
+            <a:r>
+              <a:rPr lang="en-US" sz="1200" b="1" kern="1200" dirty="0" smtClean="0">
+                <a:solidFill>
+                  <a:schemeClr val="tx1"/>
+                </a:solidFill>
+                <a:effectLst/>
+                <a:latin typeface="+mn-lt"/>
+                <a:ea typeface="+mn-ea"/>
+                <a:cs typeface="+mn-cs"/>
+              </a:rPr>
+              <a:t>second dataset will need to be treated because the information is stored on a table of a </a:t>
+            </a:r>
+            <a:r>
+              <a:rPr lang="en-US" sz="1200" b="1" u="sng" kern="1200" dirty="0" smtClean="0">
+                <a:solidFill>
+                  <a:schemeClr val="tx1"/>
+                </a:solidFill>
+                <a:effectLst/>
+                <a:latin typeface="+mn-lt"/>
+                <a:ea typeface="+mn-ea"/>
+                <a:cs typeface="+mn-cs"/>
+                <a:hlinkClick r:id="rId3"/>
+              </a:rPr>
+              <a:t>Wikipedia Web Page</a:t>
+            </a:r>
+            <a:r>
+              <a:rPr lang="en-US" sz="1200" b="1" kern="1200" dirty="0" smtClean="0">
+                <a:solidFill>
+                  <a:schemeClr val="tx1"/>
+                </a:solidFill>
+                <a:effectLst/>
+                <a:latin typeface="+mn-lt"/>
+                <a:ea typeface="+mn-ea"/>
+                <a:cs typeface="+mn-cs"/>
+              </a:rPr>
+              <a:t>. Furthermore, the last dataset will complement the first dataset, which doesn't contain the brands sales.</a:t>
+            </a:r>
+          </a:p>
+          <a:p>
+            <a:pPr marL="0" marR="0" lvl="0" indent="0" algn="l" defTabSz="914400" rtl="0" eaLnBrk="1" fontAlgn="auto" latinLnBrk="0" hangingPunct="1">
+              <a:lnSpc>
+                <a:spcPct val="100000"/>
+              </a:lnSpc>
+              <a:spcBef>
+                <a:spcPts val="0"/>
+              </a:spcBef>
+              <a:spcAft>
+                <a:spcPts val="0"/>
+              </a:spcAft>
+              <a:buClrTx/>
+              <a:buSzTx/>
+              <a:buFontTx/>
+              <a:buNone/>
+              <a:tabLst/>
+              <a:defRPr/>
+            </a:pPr>
+            <a:endParaRPr lang="en-US" sz="1200" b="1" kern="1200" dirty="0" smtClean="0">
+              <a:solidFill>
+                <a:schemeClr val="tx1"/>
+              </a:solidFill>
+              <a:effectLst/>
+              <a:latin typeface="+mn-lt"/>
+              <a:ea typeface="+mn-ea"/>
+              <a:cs typeface="+mn-cs"/>
+            </a:endParaRPr>
+          </a:p>
+          <a:p>
+            <a:pPr marL="0" marR="0" lvl="0" indent="0" algn="l" defTabSz="914400" rtl="0" eaLnBrk="1" fontAlgn="auto" latinLnBrk="0" hangingPunct="1">
+              <a:lnSpc>
+                <a:spcPct val="100000"/>
+              </a:lnSpc>
+              <a:spcBef>
+                <a:spcPts val="0"/>
+              </a:spcBef>
+              <a:spcAft>
+                <a:spcPts val="0"/>
+              </a:spcAft>
+              <a:buClrTx/>
+              <a:buSzTx/>
+              <a:buFontTx/>
+              <a:buNone/>
+              <a:tabLst/>
+              <a:defRPr/>
+            </a:pPr>
+            <a:r>
+              <a:rPr lang="pt-PT" sz="1200" b="1" kern="1200" dirty="0" smtClean="0">
+                <a:solidFill>
+                  <a:schemeClr val="tx1"/>
+                </a:solidFill>
+                <a:effectLst/>
+                <a:latin typeface="+mn-lt"/>
+                <a:ea typeface="+mn-ea"/>
+                <a:cs typeface="+mn-cs"/>
+              </a:rPr>
+              <a:t>https://en.wikipedia.org/wiki/List_of_best-selling_mobile_phones#Annual_sales_by_manufacturer</a:t>
+            </a:r>
+          </a:p>
+          <a:p>
             <a:endParaRPr lang="en-US" baseline="0" dirty="0"/>
           </a:p>
         </p:txBody>
@@ -1569,7 +2098,7 @@
             <a:fld id="{F535F173-C1DD-4975-94BF-5B9ED67F7674}" type="slidenum">
               <a:rPr lang="en-US" smtClean="0"/>
               <a:pPr/>
-              <a:t>9</a:t>
+              <a:t>6</a:t>
             </a:fld>
             <a:endParaRPr lang="en-US"/>
           </a:p>
@@ -1578,7 +2107,7 @@
     </p:spTree>
     <p:extLst>
       <p:ext uri="{BB962C8B-B14F-4D97-AF65-F5344CB8AC3E}">
-        <p14:creationId xmlns:p14="http://schemas.microsoft.com/office/powerpoint/2010/main" val="3382372434"/>
+        <p14:creationId xmlns:p14="http://schemas.microsoft.com/office/powerpoint/2010/main" val="2874797275"/>
       </p:ext>
     </p:extLst>
   </p:cSld>
@@ -1607,7 +2136,7 @@
       </p:grpSpPr>
       <p:sp>
         <p:nvSpPr>
-          <p:cNvPr id="2" name="Slide Image Placeholder 1"/>
+          <p:cNvPr id="2" name="Marcador de Posição da Imagem do Diapositivo 1"/>
           <p:cNvSpPr>
             <a:spLocks noGrp="1" noRot="1" noChangeAspect="1"/>
           </p:cNvSpPr>
@@ -1619,7 +2148,7 @@
       </p:sp>
       <p:sp>
         <p:nvSpPr>
-          <p:cNvPr id="3" name="Notes Placeholder 2"/>
+          <p:cNvPr id="3" name="Marcador de Posição de Notas 2"/>
           <p:cNvSpPr>
             <a:spLocks noGrp="1"/>
           </p:cNvSpPr>
@@ -1632,13 +2161,17 @@
           <a:bodyPr/>
           <a:lstStyle/>
           <a:p>
-            <a:endParaRPr lang="en-US" baseline="0" dirty="0"/>
-          </a:p>
-        </p:txBody>
-      </p:sp>
-      <p:sp>
-        <p:nvSpPr>
-          <p:cNvPr id="4" name="Slide Number Placeholder 3"/>
+            <a:r>
+              <a:rPr lang="pt-PT" dirty="0" smtClean="0"/>
+              <a:t>(Sousa)</a:t>
+            </a:r>
+            <a:endParaRPr lang="pt-PT" dirty="0"/>
+          </a:p>
+        </p:txBody>
+      </p:sp>
+      <p:sp>
+        <p:nvSpPr>
+          <p:cNvPr id="4" name="Marcador de Posição do Número do Diapositivo 3"/>
           <p:cNvSpPr>
             <a:spLocks noGrp="1"/>
           </p:cNvSpPr>
@@ -1654,7 +2187,7 @@
             <a:fld id="{F535F173-C1DD-4975-94BF-5B9ED67F7674}" type="slidenum">
               <a:rPr lang="en-US" smtClean="0"/>
               <a:pPr/>
-              <a:t>10</a:t>
+              <a:t>7</a:t>
             </a:fld>
             <a:endParaRPr lang="en-US"/>
           </a:p>
@@ -1663,7 +2196,7 @@
     </p:spTree>
     <p:extLst>
       <p:ext uri="{BB962C8B-B14F-4D97-AF65-F5344CB8AC3E}">
-        <p14:creationId xmlns:p14="http://schemas.microsoft.com/office/powerpoint/2010/main" val="1162443830"/>
+        <p14:creationId xmlns:p14="http://schemas.microsoft.com/office/powerpoint/2010/main" val="4225017185"/>
       </p:ext>
     </p:extLst>
   </p:cSld>
@@ -1717,7 +2250,10 @@
           <a:bodyPr/>
           <a:lstStyle/>
           <a:p>
-            <a:endParaRPr lang="en-US" baseline="0" dirty="0"/>
+            <a:r>
+              <a:rPr lang="en-US" baseline="0" dirty="0" smtClean="0"/>
+              <a:t>(Isabel)</a:t>
+            </a:r>
           </a:p>
         </p:txBody>
       </p:sp>
@@ -1739,7 +2275,7 @@
             <a:fld id="{F535F173-C1DD-4975-94BF-5B9ED67F7674}" type="slidenum">
               <a:rPr lang="en-US" smtClean="0"/>
               <a:pPr/>
-              <a:t>12</a:t>
+              <a:t>8</a:t>
             </a:fld>
             <a:endParaRPr lang="en-US"/>
           </a:p>
@@ -1748,7 +2284,7 @@
     </p:spTree>
     <p:extLst>
       <p:ext uri="{BB962C8B-B14F-4D97-AF65-F5344CB8AC3E}">
-        <p14:creationId xmlns:p14="http://schemas.microsoft.com/office/powerpoint/2010/main" val="35205596"/>
+        <p14:creationId xmlns:p14="http://schemas.microsoft.com/office/powerpoint/2010/main" val="1355792998"/>
       </p:ext>
     </p:extLst>
   </p:cSld>
@@ -1802,6 +2338,10 @@
           <a:bodyPr/>
           <a:lstStyle/>
           <a:p>
+            <a:r>
+              <a:rPr lang="en-US" baseline="0" dirty="0" smtClean="0"/>
+              <a:t>(Daniel)</a:t>
+            </a:r>
             <a:endParaRPr lang="en-US" baseline="0" dirty="0"/>
           </a:p>
         </p:txBody>
@@ -1824,7 +2364,7 @@
             <a:fld id="{F535F173-C1DD-4975-94BF-5B9ED67F7674}" type="slidenum">
               <a:rPr lang="en-US" smtClean="0"/>
               <a:pPr/>
-              <a:t>13</a:t>
+              <a:t>9</a:t>
             </a:fld>
             <a:endParaRPr lang="en-US"/>
           </a:p>
@@ -1833,7 +2373,7 @@
     </p:spTree>
     <p:extLst>
       <p:ext uri="{BB962C8B-B14F-4D97-AF65-F5344CB8AC3E}">
-        <p14:creationId xmlns:p14="http://schemas.microsoft.com/office/powerpoint/2010/main" val="494508095"/>
+        <p14:creationId xmlns:p14="http://schemas.microsoft.com/office/powerpoint/2010/main" val="3382372434"/>
       </p:ext>
     </p:extLst>
   </p:cSld>
@@ -4290,15 +4830,7 @@
                   <a:schemeClr val="bg2"/>
                 </a:solidFill>
               </a:rPr>
-              <a:t>89425 </a:t>
-            </a:r>
-            <a:r>
-              <a:rPr lang="pt-PT" sz="2400" b="0" dirty="0" smtClean="0">
-                <a:solidFill>
-                  <a:schemeClr val="bg2"/>
-                </a:solidFill>
-              </a:rPr>
-              <a:t>– Daniel Pereira</a:t>
+              <a:t>89425 – Daniel Pereira</a:t>
             </a:r>
             <a:endParaRPr lang="pt-PT" sz="2400" b="0" dirty="0">
               <a:solidFill>
@@ -5058,13 +5590,6 @@
               </a:rPr>
               <a:t>}</a:t>
             </a:r>
-            <a:endParaRPr lang="en-US" sz="2800" dirty="0">
-              <a:solidFill>
-                <a:schemeClr val="tx1"/>
-              </a:solidFill>
-              <a:latin typeface="Courier New" panose="02070309020205020404" pitchFamily="49" charset="0"/>
-              <a:cs typeface="Courier New" panose="02070309020205020404" pitchFamily="49" charset="0"/>
-            </a:endParaRPr>
           </a:p>
         </p:txBody>
       </p:sp>

</xml_diff>